<commit_message>
Upload flowchart of Renewal Application Process
1. Edited the header from “Overview of Renewal Registration Process” to “Overview of Renewal Application Process”
2. Edited the steps black headers on capitalisation (i.e. "Submit Your Application, "Pay Renewal Fee" from small caps to caps for every first letter)
</commit_message>
<xml_diff>
--- a/images/Renewal Application Process_20200528.pptx
+++ b/images/Renewal Application Process_20200528.pptx
@@ -121,10 +121,10 @@
       </p14:sectionLst>
     </p:ext>
     <p:ext uri="{EFAFB233-063F-42B5-8137-9DF3F51BA10A}">
-      <p15:sldGuideLst xmlns:p15="http://schemas.microsoft.com/office/powerpoint/2012/main"/>
+      <p15:sldGuideLst xmlns:p15="http://schemas.microsoft.com/office/powerpoint/2012/main" xmlns=""/>
     </p:ext>
     <p:ext uri="{2D200454-40CA-4A62-9FC3-DE9A4176ACB9}">
-      <p15:notesGuideLst xmlns:p15="http://schemas.microsoft.com/office/powerpoint/2012/main"/>
+      <p15:notesGuideLst xmlns:p15="http://schemas.microsoft.com/office/powerpoint/2012/main" xmlns=""/>
     </p:ext>
   </p:extLst>
 </p:presentation>
@@ -133,46 +133,22 @@
 <file path=ppt/commentAuthors.xml><?xml version="1.0" encoding="utf-8"?>
 <p:cmAuthorLst xmlns:a="http://schemas.openxmlformats.org/drawingml/2006/main" xmlns:r="http://schemas.openxmlformats.org/officeDocument/2006/relationships" xmlns:p="http://schemas.openxmlformats.org/presentationml/2006/main">
   <p:cmAuthor id="1" name="Denise Chew" initials="DC(" lastIdx="26" clrIdx="0">
-    <p:extLst>
-      <p:ext uri="{19B8F6BF-5375-455C-9EA6-DF929625EA0E}">
-        <p15:presenceInfo xmlns:p15="http://schemas.microsoft.com/office/powerpoint/2012/main" userId="Denise Chew" providerId="None"/>
-      </p:ext>
-    </p:extLst>
+    <p:extLst/>
   </p:cmAuthor>
   <p:cmAuthor id="2" name="Joanne Koh (MLAW)" initials="MLAWJK" lastIdx="26" clrIdx="1">
-    <p:extLst>
-      <p:ext uri="{19B8F6BF-5375-455C-9EA6-DF929625EA0E}">
-        <p15:presenceInfo xmlns:p15="http://schemas.microsoft.com/office/powerpoint/2012/main" userId="Joanne Koh (MLAW)" providerId="None"/>
-      </p:ext>
-    </p:extLst>
+    <p:extLst/>
   </p:cmAuthor>
   <p:cmAuthor id="3" name="Lay May LEOW (MLAW)" initials="LML(" lastIdx="1" clrIdx="2">
-    <p:extLst>
-      <p:ext uri="{19B8F6BF-5375-455C-9EA6-DF929625EA0E}">
-        <p15:presenceInfo xmlns:p15="http://schemas.microsoft.com/office/powerpoint/2012/main" userId="Lay May LEOW (MLAW)" providerId="None"/>
-      </p:ext>
-    </p:extLst>
+    <p:extLst/>
   </p:cmAuthor>
   <p:cmAuthor id="4" name="Paramjit SINGH (MLAW)" initials="PSH" lastIdx="7" clrIdx="3">
-    <p:extLst>
-      <p:ext uri="{19B8F6BF-5375-455C-9EA6-DF929625EA0E}">
-        <p15:presenceInfo xmlns:p15="http://schemas.microsoft.com/office/powerpoint/2012/main" userId="Paramjit SINGH (MLAW)" providerId="None"/>
-      </p:ext>
-    </p:extLst>
+    <p:extLst/>
   </p:cmAuthor>
   <p:cmAuthor id="5" name="Author" initials="IWT" lastIdx="1" clrIdx="4">
-    <p:extLst>
-      <p:ext uri="{19B8F6BF-5375-455C-9EA6-DF929625EA0E}">
-        <p15:presenceInfo xmlns:p15="http://schemas.microsoft.com/office/powerpoint/2012/main" userId="Author" providerId="None"/>
-      </p:ext>
-    </p:extLst>
+    <p:extLst/>
   </p:cmAuthor>
   <p:cmAuthor id="6" name="Ian Wern TAN (MLAW)" initials="IWT" lastIdx="3" clrIdx="5">
-    <p:extLst>
-      <p:ext uri="{19B8F6BF-5375-455C-9EA6-DF929625EA0E}">
-        <p15:presenceInfo xmlns:p15="http://schemas.microsoft.com/office/powerpoint/2012/main" userId="Ian Wern TAN (MLAW)" providerId="None"/>
-      </p:ext>
-    </p:extLst>
+    <p:extLst/>
   </p:cmAuthor>
 </p:cmAuthorLst>
 </file>
@@ -962,7 +938,7 @@
           <a:p>
             <a:fld id="{D930F4B6-BDC4-490D-A6F0-0EC7925F0AD2}" type="datetime1">
               <a:rPr lang="en-US" smtClean="0"/>
-              <a:t>28-May-20</a:t>
+              <a:t>5/28/2020</a:t>
             </a:fld>
             <a:endParaRPr lang="en-US" dirty="0"/>
           </a:p>
@@ -1203,7 +1179,7 @@
           <a:p>
             <a:fld id="{1BEC1971-903D-4579-8AC7-C36D595179A4}" type="datetime1">
               <a:rPr lang="en-US" smtClean="0"/>
-              <a:t>28-May-20</a:t>
+              <a:t>5/28/2020</a:t>
             </a:fld>
             <a:endParaRPr lang="en-US" dirty="0"/>
           </a:p>
@@ -1398,7 +1374,7 @@
           <a:p>
             <a:fld id="{372E795C-4380-4D22-9FD2-CB696580F2FF}" type="datetime1">
               <a:rPr lang="en-US" smtClean="0"/>
-              <a:t>28-May-20</a:t>
+              <a:t>5/28/2020</a:t>
             </a:fld>
             <a:endParaRPr lang="en-US" dirty="0"/>
           </a:p>
@@ -1634,7 +1610,7 @@
           <a:p>
             <a:fld id="{C1EF3431-1545-4730-AF40-2DF66F6D1D75}" type="datetime1">
               <a:rPr lang="en-US" smtClean="0"/>
-              <a:t>28-May-20</a:t>
+              <a:t>5/28/2020</a:t>
             </a:fld>
             <a:endParaRPr lang="en-US" dirty="0"/>
           </a:p>
@@ -1961,7 +1937,7 @@
           <a:p>
             <a:fld id="{76F84001-BF86-42BF-A02A-D23C311A2D06}" type="datetime1">
               <a:rPr lang="en-US" smtClean="0"/>
-              <a:t>28-May-20</a:t>
+              <a:t>5/28/2020</a:t>
             </a:fld>
             <a:endParaRPr lang="en-US" dirty="0"/>
           </a:p>
@@ -2272,7 +2248,7 @@
           <a:p>
             <a:fld id="{DDB7B6BC-4A4B-498C-BF09-285A644454DC}" type="datetime1">
               <a:rPr lang="en-US" smtClean="0"/>
-              <a:t>28-May-20</a:t>
+              <a:t>5/28/2020</a:t>
             </a:fld>
             <a:endParaRPr lang="en-US" dirty="0"/>
           </a:p>
@@ -2759,7 +2735,7 @@
           <a:p>
             <a:fld id="{D2F0BDA9-4B2A-4B69-B792-48A6E158EF46}" type="datetime1">
               <a:rPr lang="en-US" smtClean="0"/>
-              <a:t>28-May-20</a:t>
+              <a:t>5/28/2020</a:t>
             </a:fld>
             <a:endParaRPr lang="en-US" dirty="0"/>
           </a:p>
@@ -2928,7 +2904,7 @@
           <a:p>
             <a:fld id="{F5DF8610-B29B-499E-B896-998D9DC07809}" type="datetime1">
               <a:rPr lang="en-US" smtClean="0"/>
-              <a:t>28-May-20</a:t>
+              <a:t>5/28/2020</a:t>
             </a:fld>
             <a:endParaRPr lang="en-US" dirty="0"/>
           </a:p>
@@ -3040,7 +3016,7 @@
           <a:p>
             <a:fld id="{65CF989D-98AB-423E-BA3D-14D3F14128CF}" type="datetime1">
               <a:rPr lang="en-US" smtClean="0"/>
-              <a:t>28-May-20</a:t>
+              <a:t>5/28/2020</a:t>
             </a:fld>
             <a:endParaRPr lang="en-US" dirty="0"/>
           </a:p>
@@ -3334,7 +3310,7 @@
           <a:p>
             <a:fld id="{1C2629B7-8D85-4787-BEA0-E25870DD0AFD}" type="datetime1">
               <a:rPr lang="en-US" smtClean="0"/>
-              <a:t>28-May-20</a:t>
+              <a:t>5/28/2020</a:t>
             </a:fld>
             <a:endParaRPr lang="en-US" dirty="0"/>
           </a:p>
@@ -3659,7 +3635,7 @@
           <a:p>
             <a:fld id="{AFE87022-F486-462E-8E48-DA6E8853E584}" type="datetime1">
               <a:rPr lang="en-US" smtClean="0"/>
-              <a:t>28-May-20</a:t>
+              <a:t>5/28/2020</a:t>
             </a:fld>
             <a:endParaRPr lang="en-US" dirty="0"/>
           </a:p>
@@ -3977,7 +3953,7 @@
           <a:p>
             <a:fld id="{F006798D-0BD4-4B1F-A7CA-751DBBC2A0FD}" type="datetime1">
               <a:rPr lang="en-US" smtClean="0"/>
-              <a:t>28-May-20</a:t>
+              <a:t>5/28/2020</a:t>
             </a:fld>
             <a:endParaRPr lang="en-US" dirty="0"/>
           </a:p>
@@ -4804,8 +4780,23 @@
                   </a:solidFill>
                   <a:cs typeface="Arial" panose="020B0604020202020204" pitchFamily="34" charset="0"/>
                 </a:rPr>
-                <a:t>your application</a:t>
+                <a:t>Y</a:t>
               </a:r>
+              <a:r>
+                <a:rPr lang="en-US" b="1" dirty="0" smtClean="0">
+                  <a:solidFill>
+                    <a:schemeClr val="tx1"/>
+                  </a:solidFill>
+                  <a:cs typeface="Arial" panose="020B0604020202020204" pitchFamily="34" charset="0"/>
+                </a:rPr>
+                <a:t>our Application</a:t>
+              </a:r>
+              <a:endParaRPr lang="en-US" b="1" dirty="0">
+                <a:solidFill>
+                  <a:schemeClr val="tx1"/>
+                </a:solidFill>
+                <a:cs typeface="Arial" panose="020B0604020202020204" pitchFamily="34" charset="0"/>
+              </a:endParaRPr>
             </a:p>
             <a:p>
               <a:endParaRPr lang="en-SG" sz="1100" b="1" dirty="0">
@@ -5303,7 +5294,16 @@
                   </a:solidFill>
                   <a:cs typeface="Arial" panose="020B0604020202020204" pitchFamily="34" charset="0"/>
                 </a:rPr>
-                <a:t>Pay Renewal  fee  </a:t>
+                <a:t>Pay Renewal  </a:t>
+              </a:r>
+              <a:r>
+                <a:rPr lang="en-US" b="1" dirty="0" smtClean="0">
+                  <a:solidFill>
+                    <a:schemeClr val="tx1"/>
+                  </a:solidFill>
+                  <a:cs typeface="Arial" panose="020B0604020202020204" pitchFamily="34" charset="0"/>
+                </a:rPr>
+                <a:t>Fee  </a:t>
               </a:r>
               <a:endParaRPr lang="en-SG" b="1" dirty="0">
                 <a:solidFill>
@@ -6434,7 +6434,7 @@
   <a:extraClrSchemeLst/>
   <a:extLst>
     <a:ext uri="{05A4C25C-085E-4340-85A3-A5531E510DB2}">
-      <thm15:themeFamily xmlns:thm15="http://schemas.microsoft.com/office/thememl/2012/main" name="Office Theme" id="{62F939B6-93AF-4DB8-9C6B-D6C7DFDC589F}" vid="{4A3C46E8-61CC-4603-A589-7422A47A8E4A}"/>
+      <thm15:themeFamily xmlns:thm15="http://schemas.microsoft.com/office/thememl/2012/main" xmlns="" name="Office Theme" id="{62F939B6-93AF-4DB8-9C6B-D6C7DFDC589F}" vid="{4A3C46E8-61CC-4603-A589-7422A47A8E4A}"/>
     </a:ext>
   </a:extLst>
 </a:theme>
@@ -6695,7 +6695,7 @@
   <a:extraClrSchemeLst/>
   <a:extLst>
     <a:ext uri="{05A4C25C-085E-4340-85A3-A5531E510DB2}">
-      <thm15:themeFamily xmlns:thm15="http://schemas.microsoft.com/office/thememl/2012/main" name="Office Theme" id="{62F939B6-93AF-4DB8-9C6B-D6C7DFDC589F}" vid="{4A3C46E8-61CC-4603-A589-7422A47A8E4A}"/>
+      <thm15:themeFamily xmlns:thm15="http://schemas.microsoft.com/office/thememl/2012/main" xmlns="" name="Office Theme" id="{62F939B6-93AF-4DB8-9C6B-D6C7DFDC589F}" vid="{4A3C46E8-61CC-4603-A589-7422A47A8E4A}"/>
     </a:ext>
   </a:extLst>
 </a:theme>

</xml_diff>